<commit_message>
Index and range added
</commit_message>
<xml_diff>
--- a/C# 8 Features.pptx
+++ b/C# 8 Features.pptx
@@ -10,7 +10,11 @@
     <p:sldId id="263" r:id="rId4"/>
     <p:sldId id="262" r:id="rId5"/>
     <p:sldId id="265" r:id="rId6"/>
-    <p:sldId id="264" r:id="rId7"/>
+    <p:sldId id="266" r:id="rId7"/>
+    <p:sldId id="267" r:id="rId8"/>
+    <p:sldId id="268" r:id="rId9"/>
+    <p:sldId id="269" r:id="rId10"/>
+    <p:sldId id="264" r:id="rId11"/>
   </p:sldIdLst>
   <p:sldSz cx="12192000" cy="6858000"/>
   <p:notesSz cx="6858000" cy="9144000"/>
@@ -361,7 +365,7 @@
           <a:p>
             <a:fld id="{9184DA70-C731-4C70-880D-CCD4705E623C}" type="datetime1">
               <a:rPr lang="en-US" smtClean="0"/>
-              <a:t>4/19/2020</a:t>
+              <a:t>5/17/2020</a:t>
             </a:fld>
             <a:endParaRPr lang="en-US" dirty="0"/>
           </a:p>
@@ -549,7 +553,7 @@
           <a:p>
             <a:fld id="{B612A279-0833-481D-8C56-F67FD0AC6C50}" type="datetime1">
               <a:rPr lang="en-US" smtClean="0"/>
-              <a:t>4/19/2020</a:t>
+              <a:t>5/17/2020</a:t>
             </a:fld>
             <a:endParaRPr lang="en-US" dirty="0"/>
           </a:p>
@@ -791,7 +795,7 @@
           <a:p>
             <a:fld id="{6587DA83-5663-4C9C-B9AA-0B40A3DAFF81}" type="datetime1">
               <a:rPr lang="en-US" smtClean="0"/>
-              <a:t>4/19/2020</a:t>
+              <a:t>5/17/2020</a:t>
             </a:fld>
             <a:endParaRPr lang="en-US" dirty="0"/>
           </a:p>
@@ -979,7 +983,7 @@
           <a:p>
             <a:fld id="{4BE1D723-8F53-4F53-90B0-1982A396982E}" type="datetime1">
               <a:rPr lang="en-US" smtClean="0"/>
-              <a:t>4/19/2020</a:t>
+              <a:t>5/17/2020</a:t>
             </a:fld>
             <a:endParaRPr lang="en-US" dirty="0"/>
           </a:p>
@@ -1352,7 +1356,7 @@
           <a:p>
             <a:fld id="{97669AF7-7BEB-44E4-9852-375E34362B5B}" type="datetime1">
               <a:rPr lang="en-US" smtClean="0"/>
-              <a:t>4/19/2020</a:t>
+              <a:t>5/17/2020</a:t>
             </a:fld>
             <a:endParaRPr lang="en-US" dirty="0"/>
           </a:p>
@@ -1607,7 +1611,7 @@
           <a:p>
             <a:fld id="{BAAAC38D-0552-4C82-B593-E6124DFADBE2}" type="datetime1">
               <a:rPr lang="en-US" smtClean="0"/>
-              <a:t>4/19/2020</a:t>
+              <a:t>5/17/2020</a:t>
             </a:fld>
             <a:endParaRPr lang="en-US" dirty="0"/>
           </a:p>
@@ -2004,7 +2008,7 @@
           <a:p>
             <a:fld id="{D9DF0F1C-5577-4ACB-BB62-DF8F3C494C7E}" type="datetime1">
               <a:rPr lang="en-US" smtClean="0"/>
-              <a:t>4/19/2020</a:t>
+              <a:t>5/17/2020</a:t>
             </a:fld>
             <a:endParaRPr lang="en-US" dirty="0"/>
           </a:p>
@@ -2140,7 +2144,7 @@
           <a:p>
             <a:fld id="{1775B394-D9F9-4F0C-B15D-605F45CB9E9F}" type="datetime1">
               <a:rPr lang="en-US" smtClean="0"/>
-              <a:t>4/19/2020</a:t>
+              <a:t>5/17/2020</a:t>
             </a:fld>
             <a:endParaRPr lang="en-US" dirty="0"/>
           </a:p>
@@ -2297,7 +2301,7 @@
           <a:p>
             <a:fld id="{39667345-2558-425A-8533-9BFDBCE15005}" type="datetime1">
               <a:rPr lang="en-US" smtClean="0"/>
-              <a:t>4/19/2020</a:t>
+              <a:t>5/17/2020</a:t>
             </a:fld>
             <a:endParaRPr lang="en-US" dirty="0"/>
           </a:p>
@@ -2626,7 +2630,7 @@
           <a:p>
             <a:fld id="{92BEA474-078D-4E9B-9B14-09A87B19DC46}" type="datetime1">
               <a:rPr lang="en-US" smtClean="0"/>
-              <a:t>4/19/2020</a:t>
+              <a:t>5/17/2020</a:t>
             </a:fld>
             <a:endParaRPr lang="en-US" dirty="0"/>
           </a:p>
@@ -2976,7 +2980,7 @@
           <a:p>
             <a:fld id="{4907D986-8816-4272-A432-0437A28A9828}" type="datetime1">
               <a:rPr lang="en-US" smtClean="0"/>
-              <a:t>4/19/2020</a:t>
+              <a:t>5/17/2020</a:t>
             </a:fld>
             <a:endParaRPr lang="en-US" dirty="0"/>
           </a:p>
@@ -3237,7 +3241,7 @@
           <a:p>
             <a:fld id="{62D6E202-B606-4609-B914-27C9371A1F6D}" type="datetime1">
               <a:rPr lang="en-US" smtClean="0"/>
-              <a:t>4/19/2020</a:t>
+              <a:t>5/17/2020</a:t>
             </a:fld>
             <a:endParaRPr lang="en-US" dirty="0"/>
           </a:p>
@@ -4057,6 +4061,91 @@
 </p:sld>
 </file>
 
+<file path=ppt/slides/slide10.xml><?xml version="1.0" encoding="utf-8"?>
+<p:sld xmlns:a="http://schemas.openxmlformats.org/drawingml/2006/main" xmlns:r="http://schemas.openxmlformats.org/officeDocument/2006/relationships" xmlns:p="http://schemas.openxmlformats.org/presentationml/2006/main">
+  <p:cSld>
+    <p:spTree>
+      <p:nvGrpSpPr>
+        <p:cNvPr id="1" name=""/>
+        <p:cNvGrpSpPr/>
+        <p:nvPr/>
+      </p:nvGrpSpPr>
+      <p:grpSpPr>
+        <a:xfrm>
+          <a:off x="0" y="0"/>
+          <a:ext cx="0" cy="0"/>
+          <a:chOff x="0" y="0"/>
+          <a:chExt cx="0" cy="0"/>
+        </a:xfrm>
+      </p:grpSpPr>
+      <p:sp>
+        <p:nvSpPr>
+          <p:cNvPr id="2" name="Title 1">
+            <a:extLst>
+              <a:ext uri="{FF2B5EF4-FFF2-40B4-BE49-F238E27FC236}">
+                <a16:creationId xmlns:a16="http://schemas.microsoft.com/office/drawing/2014/main" id="{DB1B6DAA-4285-498E-80EC-7C831B5C802C}"/>
+              </a:ext>
+            </a:extLst>
+          </p:cNvPr>
+          <p:cNvSpPr>
+            <a:spLocks noGrp="1"/>
+          </p:cNvSpPr>
+          <p:nvPr>
+            <p:ph type="title"/>
+          </p:nvPr>
+        </p:nvSpPr>
+        <p:spPr>
+          <a:xfrm>
+            <a:off x="1097280" y="286603"/>
+            <a:ext cx="10058400" cy="4089454"/>
+          </a:xfrm>
+        </p:spPr>
+        <p:txBody>
+          <a:bodyPr>
+            <a:normAutofit/>
+          </a:bodyPr>
+          <a:lstStyle/>
+          <a:p>
+            <a:br>
+              <a:rPr lang="en-GB" dirty="0"/>
+            </a:br>
+            <a:br>
+              <a:rPr lang="en-GB" dirty="0"/>
+            </a:br>
+            <a:br>
+              <a:rPr lang="en-GB" dirty="0"/>
+            </a:br>
+            <a:br>
+              <a:rPr lang="en-GB" dirty="0"/>
+            </a:br>
+            <a:r>
+              <a:rPr lang="en-GB" dirty="0"/>
+              <a:t>               Thanks </a:t>
+            </a:r>
+            <a:r>
+              <a:rPr lang="en-GB"/>
+              <a:t>for Watching </a:t>
+            </a:r>
+            <a:br>
+              <a:rPr lang="en-GB" dirty="0"/>
+            </a:br>
+            <a:endParaRPr lang="en-GB" dirty="0"/>
+          </a:p>
+        </p:txBody>
+      </p:sp>
+    </p:spTree>
+    <p:extLst>
+      <p:ext uri="{BB962C8B-B14F-4D97-AF65-F5344CB8AC3E}">
+        <p14:creationId xmlns:p14="http://schemas.microsoft.com/office/powerpoint/2010/main" val="3362609727"/>
+      </p:ext>
+    </p:extLst>
+  </p:cSld>
+  <p:clrMapOvr>
+    <a:masterClrMapping/>
+  </p:clrMapOvr>
+</p:sld>
+</file>
+
 <file path=ppt/slides/slide2.xml><?xml version="1.0" encoding="utf-8"?>
 <p:sld xmlns:a="http://schemas.openxmlformats.org/drawingml/2006/main" xmlns:r="http://schemas.openxmlformats.org/officeDocument/2006/relationships" xmlns:p="http://schemas.openxmlformats.org/presentationml/2006/main">
   <p:cSld>
@@ -5364,6 +5453,14 @@
 <file path=ppt/slides/slide6.xml><?xml version="1.0" encoding="utf-8"?>
 <p:sld xmlns:a="http://schemas.openxmlformats.org/drawingml/2006/main" xmlns:r="http://schemas.openxmlformats.org/officeDocument/2006/relationships" xmlns:p="http://schemas.openxmlformats.org/presentationml/2006/main">
   <p:cSld>
+    <p:bg>
+      <p:bgPr>
+        <a:solidFill>
+          <a:schemeClr val="bg1"/>
+        </a:solidFill>
+        <a:effectLst/>
+      </p:bgPr>
+    </p:bg>
     <p:spTree>
       <p:nvGrpSpPr>
         <p:cNvPr id="1" name=""/>
@@ -5378,26 +5475,120 @@
           <a:chExt cx="0" cy="0"/>
         </a:xfrm>
       </p:grpSpPr>
+      <p:pic>
+        <p:nvPicPr>
+          <p:cNvPr id="4" name="Picture 3">
+            <a:extLst>
+              <a:ext uri="{FF2B5EF4-FFF2-40B4-BE49-F238E27FC236}">
+                <a16:creationId xmlns:a16="http://schemas.microsoft.com/office/drawing/2014/main" id="{0ACC8F08-B671-4845-B0BD-DD55DFCCCB95}"/>
+              </a:ext>
+            </a:extLst>
+          </p:cNvPr>
+          <p:cNvPicPr>
+            <a:picLocks noChangeAspect="1"/>
+          </p:cNvPicPr>
+          <p:nvPr/>
+        </p:nvPicPr>
+        <p:blipFill rotWithShape="1">
+          <a:blip r:embed="rId2"/>
+          <a:srcRect t="15730"/>
+          <a:stretch/>
+        </p:blipFill>
+        <p:spPr>
+          <a:xfrm>
+            <a:off x="-10962" y="-917266"/>
+            <a:ext cx="12191999" cy="6857990"/>
+          </a:xfrm>
+          <a:prstGeom prst="rect">
+            <a:avLst/>
+          </a:prstGeom>
+        </p:spPr>
+      </p:pic>
+      <p:sp>
+        <p:nvSpPr>
+          <p:cNvPr id="9" name="Rectangle 8">
+            <a:extLst>
+              <a:ext uri="{FF2B5EF4-FFF2-40B4-BE49-F238E27FC236}">
+                <a16:creationId xmlns:a16="http://schemas.microsoft.com/office/drawing/2014/main" id="{7319A1DD-F557-4EC6-8A8C-F7617B4CD678}"/>
+              </a:ext>
+              <a:ext uri="{C183D7F6-B498-43B3-948B-1728B52AA6E4}">
+                <adec:decorative xmlns:adec="http://schemas.microsoft.com/office/drawing/2017/decorative" val="1"/>
+              </a:ext>
+            </a:extLst>
+          </p:cNvPr>
+          <p:cNvSpPr>
+            <a:spLocks noGrp="1" noRot="1" noChangeAspect="1" noMove="1" noResize="1" noEditPoints="1" noAdjustHandles="1" noChangeArrowheads="1" noChangeShapeType="1" noTextEdit="1"/>
+          </p:cNvSpPr>
+          <p:nvPr>
+            <p:extLst>
+              <p:ext uri="{386F3935-93C4-4BCD-93E2-E3B085C9AB24}">
+                <p16:designElem xmlns:p16="http://schemas.microsoft.com/office/powerpoint/2015/main" val="1"/>
+              </p:ext>
+            </p:extLst>
+          </p:nvPr>
+        </p:nvSpPr>
+        <p:spPr>
+          <a:xfrm>
+            <a:off x="-1" y="3118982"/>
+            <a:ext cx="7537704" cy="2462668"/>
+          </a:xfrm>
+          <a:prstGeom prst="rect">
+            <a:avLst/>
+          </a:prstGeom>
+          <a:solidFill>
+            <a:schemeClr val="bg1">
+              <a:alpha val="85000"/>
+            </a:schemeClr>
+          </a:solidFill>
+          <a:ln>
+            <a:noFill/>
+          </a:ln>
+        </p:spPr>
+        <p:style>
+          <a:lnRef idx="2">
+            <a:schemeClr val="accent1">
+              <a:shade val="50000"/>
+            </a:schemeClr>
+          </a:lnRef>
+          <a:fillRef idx="1">
+            <a:schemeClr val="accent1"/>
+          </a:fillRef>
+          <a:effectRef idx="0">
+            <a:schemeClr val="accent1"/>
+          </a:effectRef>
+          <a:fontRef idx="minor">
+            <a:schemeClr val="lt1"/>
+          </a:fontRef>
+        </p:style>
+        <p:txBody>
+          <a:bodyPr rtlCol="0" anchor="ctr"/>
+          <a:lstStyle/>
+          <a:p>
+            <a:pPr algn="ctr"/>
+            <a:endParaRPr lang="en-US"/>
+          </a:p>
+        </p:txBody>
+      </p:sp>
       <p:sp>
         <p:nvSpPr>
           <p:cNvPr id="2" name="Title 1">
             <a:extLst>
               <a:ext uri="{FF2B5EF4-FFF2-40B4-BE49-F238E27FC236}">
-                <a16:creationId xmlns:a16="http://schemas.microsoft.com/office/drawing/2014/main" id="{DB1B6DAA-4285-498E-80EC-7C831B5C802C}"/>
-              </a:ext>
-            </a:extLst>
-          </p:cNvPr>
-          <p:cNvSpPr>
-            <a:spLocks noGrp="1"/>
-          </p:cNvSpPr>
-          <p:nvPr>
-            <p:ph type="title"/>
-          </p:nvPr>
-        </p:nvSpPr>
-        <p:spPr>
-          <a:xfrm>
-            <a:off x="1097280" y="286603"/>
-            <a:ext cx="10058400" cy="4089454"/>
+                <a16:creationId xmlns:a16="http://schemas.microsoft.com/office/drawing/2014/main" id="{281D9A1C-110F-44DB-9C27-E83394EACB40}"/>
+              </a:ext>
+            </a:extLst>
+          </p:cNvPr>
+          <p:cNvSpPr>
+            <a:spLocks noGrp="1"/>
+          </p:cNvSpPr>
+          <p:nvPr>
+            <p:ph type="ctrTitle"/>
+          </p:nvPr>
+        </p:nvSpPr>
+        <p:spPr>
+          <a:xfrm>
+            <a:off x="735791" y="3331444"/>
+            <a:ext cx="6941718" cy="1229306"/>
           </a:xfrm>
         </p:spPr>
         <p:txBody>
@@ -5406,43 +5597,1487 @@
           </a:bodyPr>
           <a:lstStyle/>
           <a:p>
-            <a:br>
-              <a:rPr lang="en-GB" dirty="0"/>
-            </a:br>
-            <a:br>
-              <a:rPr lang="en-GB" dirty="0"/>
-            </a:br>
-            <a:br>
-              <a:rPr lang="en-GB" dirty="0"/>
-            </a:br>
-            <a:br>
-              <a:rPr lang="en-GB" dirty="0"/>
-            </a:br>
-            <a:r>
-              <a:rPr lang="en-GB" dirty="0"/>
-              <a:t>               Thanks </a:t>
-            </a:r>
-            <a:r>
-              <a:rPr lang="en-GB"/>
-              <a:t>for Watching </a:t>
-            </a:r>
-            <a:br>
-              <a:rPr lang="en-GB" dirty="0"/>
-            </a:br>
-            <a:endParaRPr lang="en-GB" dirty="0"/>
-          </a:p>
-        </p:txBody>
+            <a:r>
+              <a:rPr lang="en-GB" sz="5400" dirty="0">
+                <a:solidFill>
+                  <a:schemeClr val="tx1"/>
+                </a:solidFill>
+              </a:rPr>
+              <a:t>Static Local Function</a:t>
+            </a:r>
+          </a:p>
+        </p:txBody>
+      </p:sp>
+      <p:sp>
+        <p:nvSpPr>
+          <p:cNvPr id="3" name="Subtitle 2">
+            <a:extLst>
+              <a:ext uri="{FF2B5EF4-FFF2-40B4-BE49-F238E27FC236}">
+                <a16:creationId xmlns:a16="http://schemas.microsoft.com/office/drawing/2014/main" id="{64147A43-CDC2-45AB-822C-0F852F96EFED}"/>
+              </a:ext>
+            </a:extLst>
+          </p:cNvPr>
+          <p:cNvSpPr>
+            <a:spLocks noGrp="1"/>
+          </p:cNvSpPr>
+          <p:nvPr>
+            <p:ph type="subTitle" idx="1"/>
+          </p:nvPr>
+        </p:nvSpPr>
+        <p:spPr>
+          <a:xfrm>
+            <a:off x="735791" y="4735799"/>
+            <a:ext cx="6470693" cy="605256"/>
+          </a:xfrm>
+        </p:spPr>
+        <p:txBody>
+          <a:bodyPr>
+            <a:normAutofit/>
+          </a:bodyPr>
+          <a:lstStyle/>
+          <a:p>
+            <a:endParaRPr lang="en-GB"/>
+          </a:p>
+        </p:txBody>
+      </p:sp>
+      <p:cxnSp>
+        <p:nvCxnSpPr>
+          <p:cNvPr id="22" name="Straight Connector 10">
+            <a:extLst>
+              <a:ext uri="{FF2B5EF4-FFF2-40B4-BE49-F238E27FC236}">
+                <a16:creationId xmlns:a16="http://schemas.microsoft.com/office/drawing/2014/main" id="{D28A9C89-B313-458F-9C85-515930A51A93}"/>
+              </a:ext>
+              <a:ext uri="{C183D7F6-B498-43B3-948B-1728B52AA6E4}">
+                <adec:decorative xmlns:adec="http://schemas.microsoft.com/office/drawing/2017/decorative" val="1"/>
+              </a:ext>
+            </a:extLst>
+          </p:cNvPr>
+          <p:cNvCxnSpPr>
+            <a:cxnSpLocks noGrp="1" noRot="1" noChangeAspect="1" noMove="1" noResize="1" noEditPoints="1" noAdjustHandles="1" noChangeArrowheads="1" noChangeShapeType="1"/>
+          </p:cNvCxnSpPr>
+          <p:nvPr>
+            <p:extLst>
+              <p:ext uri="{386F3935-93C4-4BCD-93E2-E3B085C9AB24}">
+                <p16:designElem xmlns:p16="http://schemas.microsoft.com/office/powerpoint/2015/main" val="1"/>
+              </p:ext>
+            </p:extLst>
+          </p:nvPr>
+        </p:nvCxnSpPr>
+        <p:spPr>
+          <a:xfrm>
+            <a:off x="772429" y="4641183"/>
+            <a:ext cx="6309360" cy="0"/>
+          </a:xfrm>
+          <a:prstGeom prst="line">
+            <a:avLst/>
+          </a:prstGeom>
+          <a:ln w="19050">
+            <a:solidFill>
+              <a:schemeClr val="accent1">
+                <a:alpha val="90000"/>
+              </a:schemeClr>
+            </a:solidFill>
+          </a:ln>
+        </p:spPr>
+        <p:style>
+          <a:lnRef idx="1">
+            <a:schemeClr val="accent1"/>
+          </a:lnRef>
+          <a:fillRef idx="0">
+            <a:schemeClr val="accent1"/>
+          </a:fillRef>
+          <a:effectRef idx="0">
+            <a:schemeClr val="accent1"/>
+          </a:effectRef>
+          <a:fontRef idx="minor">
+            <a:schemeClr val="tx1"/>
+          </a:fontRef>
+        </p:style>
+      </p:cxnSp>
+      <p:sp>
+        <p:nvSpPr>
+          <p:cNvPr id="13" name="Rectangle 12">
+            <a:extLst>
+              <a:ext uri="{FF2B5EF4-FFF2-40B4-BE49-F238E27FC236}">
+                <a16:creationId xmlns:a16="http://schemas.microsoft.com/office/drawing/2014/main" id="{C390A367-0330-4E03-9D5F-40308A7975C8}"/>
+              </a:ext>
+              <a:ext uri="{C183D7F6-B498-43B3-948B-1728B52AA6E4}">
+                <adec:decorative xmlns:adec="http://schemas.microsoft.com/office/drawing/2017/decorative" val="1"/>
+              </a:ext>
+            </a:extLst>
+          </p:cNvPr>
+          <p:cNvSpPr>
+            <a:spLocks noGrp="1" noRot="1" noChangeAspect="1" noMove="1" noResize="1" noEditPoints="1" noAdjustHandles="1" noChangeArrowheads="1" noChangeShapeType="1" noTextEdit="1"/>
+          </p:cNvSpPr>
+          <p:nvPr>
+            <p:extLst>
+              <p:ext uri="{386F3935-93C4-4BCD-93E2-E3B085C9AB24}">
+                <p16:designElem xmlns:p16="http://schemas.microsoft.com/office/powerpoint/2015/main" val="1"/>
+              </p:ext>
+            </p:extLst>
+          </p:nvPr>
+        </p:nvSpPr>
+        <p:spPr>
+          <a:xfrm>
+            <a:off x="1" y="6400800"/>
+            <a:ext cx="12192000" cy="457200"/>
+          </a:xfrm>
+          <a:prstGeom prst="rect">
+            <a:avLst/>
+          </a:prstGeom>
+          <a:solidFill>
+            <a:srgbClr val="262626">
+              <a:alpha val="95000"/>
+            </a:srgbClr>
+          </a:solidFill>
+          <a:ln>
+            <a:noFill/>
+          </a:ln>
+        </p:spPr>
+        <p:style>
+          <a:lnRef idx="2">
+            <a:schemeClr val="accent1">
+              <a:shade val="50000"/>
+            </a:schemeClr>
+          </a:lnRef>
+          <a:fillRef idx="1">
+            <a:schemeClr val="accent1"/>
+          </a:fillRef>
+          <a:effectRef idx="0">
+            <a:schemeClr val="accent1"/>
+          </a:effectRef>
+          <a:fontRef idx="minor">
+            <a:schemeClr val="lt1"/>
+          </a:fontRef>
+        </p:style>
       </p:sp>
     </p:spTree>
     <p:extLst>
       <p:ext uri="{BB962C8B-B14F-4D97-AF65-F5344CB8AC3E}">
-        <p14:creationId xmlns:p14="http://schemas.microsoft.com/office/powerpoint/2010/main" val="3362609727"/>
+        <p14:creationId xmlns:p14="http://schemas.microsoft.com/office/powerpoint/2010/main" val="2215706171"/>
+      </p:ext>
+    </p:extLst>
+  </p:cSld>
+  <p:clrMapOvr>
+    <a:overrideClrMapping bg1="dk1" tx1="lt1" bg2="dk2" tx2="lt2" accent1="accent1" accent2="accent2" accent3="accent3" accent4="accent4" accent5="accent5" accent6="accent6" hlink="hlink" folHlink="folHlink"/>
+  </p:clrMapOvr>
+</p:sld>
+</file>
+
+<file path=ppt/slides/slide7.xml><?xml version="1.0" encoding="utf-8"?>
+<p:sld xmlns:a="http://schemas.openxmlformats.org/drawingml/2006/main" xmlns:r="http://schemas.openxmlformats.org/officeDocument/2006/relationships" xmlns:p="http://schemas.openxmlformats.org/presentationml/2006/main">
+  <p:cSld>
+    <p:spTree>
+      <p:nvGrpSpPr>
+        <p:cNvPr id="1" name=""/>
+        <p:cNvGrpSpPr/>
+        <p:nvPr/>
+      </p:nvGrpSpPr>
+      <p:grpSpPr>
+        <a:xfrm>
+          <a:off x="0" y="0"/>
+          <a:ext cx="0" cy="0"/>
+          <a:chOff x="0" y="0"/>
+          <a:chExt cx="0" cy="0"/>
+        </a:xfrm>
+      </p:grpSpPr>
+      <p:sp>
+        <p:nvSpPr>
+          <p:cNvPr id="2" name="Title 1">
+            <a:extLst>
+              <a:ext uri="{FF2B5EF4-FFF2-40B4-BE49-F238E27FC236}">
+                <a16:creationId xmlns:a16="http://schemas.microsoft.com/office/drawing/2014/main" id="{338A8B9E-7AF1-4C9C-AC40-613EEBD9C3C5}"/>
+              </a:ext>
+            </a:extLst>
+          </p:cNvPr>
+          <p:cNvSpPr>
+            <a:spLocks noGrp="1"/>
+          </p:cNvSpPr>
+          <p:nvPr>
+            <p:ph type="title"/>
+          </p:nvPr>
+        </p:nvSpPr>
+        <p:spPr/>
+        <p:txBody>
+          <a:bodyPr/>
+          <a:lstStyle/>
+          <a:p>
+            <a:endParaRPr lang="en-GB" dirty="0"/>
+          </a:p>
+        </p:txBody>
+      </p:sp>
+      <p:sp>
+        <p:nvSpPr>
+          <p:cNvPr id="3" name="Content Placeholder 2">
+            <a:extLst>
+              <a:ext uri="{FF2B5EF4-FFF2-40B4-BE49-F238E27FC236}">
+                <a16:creationId xmlns:a16="http://schemas.microsoft.com/office/drawing/2014/main" id="{8DA2A4A2-78C0-441F-B021-B15FECE71C13}"/>
+              </a:ext>
+            </a:extLst>
+          </p:cNvPr>
+          <p:cNvSpPr>
+            <a:spLocks noGrp="1"/>
+          </p:cNvSpPr>
+          <p:nvPr>
+            <p:ph idx="1"/>
+          </p:nvPr>
+        </p:nvSpPr>
+        <p:spPr/>
+        <p:txBody>
+          <a:bodyPr/>
+          <a:lstStyle/>
+          <a:p>
+            <a:r>
+              <a:rPr lang="en-GB" dirty="0"/>
+              <a:t>Why we needs this ?</a:t>
+            </a:r>
+          </a:p>
+          <a:p>
+            <a:r>
+              <a:rPr lang="en-GB" dirty="0"/>
+              <a:t>If we want the local function not to capture any reference of a variable with the enclosing scope </a:t>
+            </a:r>
+          </a:p>
+        </p:txBody>
+      </p:sp>
+    </p:spTree>
+    <p:extLst>
+      <p:ext uri="{BB962C8B-B14F-4D97-AF65-F5344CB8AC3E}">
+        <p14:creationId xmlns:p14="http://schemas.microsoft.com/office/powerpoint/2010/main" val="713448578"/>
       </p:ext>
     </p:extLst>
   </p:cSld>
   <p:clrMapOvr>
     <a:masterClrMapping/>
   </p:clrMapOvr>
+</p:sld>
+</file>
+
+<file path=ppt/slides/slide8.xml><?xml version="1.0" encoding="utf-8"?>
+<p:sld xmlns:a="http://schemas.openxmlformats.org/drawingml/2006/main" xmlns:r="http://schemas.openxmlformats.org/officeDocument/2006/relationships" xmlns:p="http://schemas.openxmlformats.org/presentationml/2006/main">
+  <p:cSld>
+    <p:bg>
+      <p:bgPr>
+        <a:solidFill>
+          <a:schemeClr val="bg1"/>
+        </a:solidFill>
+        <a:effectLst/>
+      </p:bgPr>
+    </p:bg>
+    <p:spTree>
+      <p:nvGrpSpPr>
+        <p:cNvPr id="1" name=""/>
+        <p:cNvGrpSpPr/>
+        <p:nvPr/>
+      </p:nvGrpSpPr>
+      <p:grpSpPr>
+        <a:xfrm>
+          <a:off x="0" y="0"/>
+          <a:ext cx="0" cy="0"/>
+          <a:chOff x="0" y="0"/>
+          <a:chExt cx="0" cy="0"/>
+        </a:xfrm>
+      </p:grpSpPr>
+      <p:pic>
+        <p:nvPicPr>
+          <p:cNvPr id="4" name="Picture 3">
+            <a:extLst>
+              <a:ext uri="{FF2B5EF4-FFF2-40B4-BE49-F238E27FC236}">
+                <a16:creationId xmlns:a16="http://schemas.microsoft.com/office/drawing/2014/main" id="{0ACC8F08-B671-4845-B0BD-DD55DFCCCB95}"/>
+              </a:ext>
+            </a:extLst>
+          </p:cNvPr>
+          <p:cNvPicPr>
+            <a:picLocks noChangeAspect="1"/>
+          </p:cNvPicPr>
+          <p:nvPr/>
+        </p:nvPicPr>
+        <p:blipFill rotWithShape="1">
+          <a:blip r:embed="rId2"/>
+          <a:srcRect t="15730"/>
+          <a:stretch/>
+        </p:blipFill>
+        <p:spPr>
+          <a:xfrm>
+            <a:off x="-10962" y="-917266"/>
+            <a:ext cx="12191999" cy="6857990"/>
+          </a:xfrm>
+          <a:prstGeom prst="rect">
+            <a:avLst/>
+          </a:prstGeom>
+        </p:spPr>
+      </p:pic>
+      <p:sp>
+        <p:nvSpPr>
+          <p:cNvPr id="9" name="Rectangle 8">
+            <a:extLst>
+              <a:ext uri="{FF2B5EF4-FFF2-40B4-BE49-F238E27FC236}">
+                <a16:creationId xmlns:a16="http://schemas.microsoft.com/office/drawing/2014/main" id="{7319A1DD-F557-4EC6-8A8C-F7617B4CD678}"/>
+              </a:ext>
+              <a:ext uri="{C183D7F6-B498-43B3-948B-1728B52AA6E4}">
+                <adec:decorative xmlns:adec="http://schemas.microsoft.com/office/drawing/2017/decorative" val="1"/>
+              </a:ext>
+            </a:extLst>
+          </p:cNvPr>
+          <p:cNvSpPr>
+            <a:spLocks noGrp="1" noRot="1" noChangeAspect="1" noMove="1" noResize="1" noEditPoints="1" noAdjustHandles="1" noChangeArrowheads="1" noChangeShapeType="1" noTextEdit="1"/>
+          </p:cNvSpPr>
+          <p:nvPr>
+            <p:extLst>
+              <p:ext uri="{386F3935-93C4-4BCD-93E2-E3B085C9AB24}">
+                <p16:designElem xmlns:p16="http://schemas.microsoft.com/office/powerpoint/2015/main" val="1"/>
+              </p:ext>
+            </p:extLst>
+          </p:nvPr>
+        </p:nvSpPr>
+        <p:spPr>
+          <a:xfrm>
+            <a:off x="-1" y="3118982"/>
+            <a:ext cx="7537704" cy="2462668"/>
+          </a:xfrm>
+          <a:prstGeom prst="rect">
+            <a:avLst/>
+          </a:prstGeom>
+          <a:solidFill>
+            <a:schemeClr val="bg1">
+              <a:alpha val="85000"/>
+            </a:schemeClr>
+          </a:solidFill>
+          <a:ln>
+            <a:noFill/>
+          </a:ln>
+        </p:spPr>
+        <p:style>
+          <a:lnRef idx="2">
+            <a:schemeClr val="accent1">
+              <a:shade val="50000"/>
+            </a:schemeClr>
+          </a:lnRef>
+          <a:fillRef idx="1">
+            <a:schemeClr val="accent1"/>
+          </a:fillRef>
+          <a:effectRef idx="0">
+            <a:schemeClr val="accent1"/>
+          </a:effectRef>
+          <a:fontRef idx="minor">
+            <a:schemeClr val="lt1"/>
+          </a:fontRef>
+        </p:style>
+        <p:txBody>
+          <a:bodyPr rtlCol="0" anchor="ctr"/>
+          <a:lstStyle/>
+          <a:p>
+            <a:pPr algn="ctr"/>
+            <a:endParaRPr lang="en-US"/>
+          </a:p>
+        </p:txBody>
+      </p:sp>
+      <p:sp>
+        <p:nvSpPr>
+          <p:cNvPr id="2" name="Title 1">
+            <a:extLst>
+              <a:ext uri="{FF2B5EF4-FFF2-40B4-BE49-F238E27FC236}">
+                <a16:creationId xmlns:a16="http://schemas.microsoft.com/office/drawing/2014/main" id="{281D9A1C-110F-44DB-9C27-E83394EACB40}"/>
+              </a:ext>
+            </a:extLst>
+          </p:cNvPr>
+          <p:cNvSpPr>
+            <a:spLocks noGrp="1"/>
+          </p:cNvSpPr>
+          <p:nvPr>
+            <p:ph type="ctrTitle"/>
+          </p:nvPr>
+        </p:nvSpPr>
+        <p:spPr>
+          <a:xfrm>
+            <a:off x="735791" y="3331444"/>
+            <a:ext cx="6941718" cy="1229306"/>
+          </a:xfrm>
+        </p:spPr>
+        <p:txBody>
+          <a:bodyPr>
+            <a:normAutofit/>
+          </a:bodyPr>
+          <a:lstStyle/>
+          <a:p>
+            <a:r>
+              <a:rPr lang="en-GB" sz="5400" dirty="0">
+                <a:solidFill>
+                  <a:schemeClr val="tx1"/>
+                </a:solidFill>
+              </a:rPr>
+              <a:t>Indices and Ranges</a:t>
+            </a:r>
+          </a:p>
+        </p:txBody>
+      </p:sp>
+      <p:sp>
+        <p:nvSpPr>
+          <p:cNvPr id="3" name="Subtitle 2">
+            <a:extLst>
+              <a:ext uri="{FF2B5EF4-FFF2-40B4-BE49-F238E27FC236}">
+                <a16:creationId xmlns:a16="http://schemas.microsoft.com/office/drawing/2014/main" id="{64147A43-CDC2-45AB-822C-0F852F96EFED}"/>
+              </a:ext>
+            </a:extLst>
+          </p:cNvPr>
+          <p:cNvSpPr>
+            <a:spLocks noGrp="1"/>
+          </p:cNvSpPr>
+          <p:nvPr>
+            <p:ph type="subTitle" idx="1"/>
+          </p:nvPr>
+        </p:nvSpPr>
+        <p:spPr>
+          <a:xfrm>
+            <a:off x="735791" y="4735799"/>
+            <a:ext cx="6470693" cy="605256"/>
+          </a:xfrm>
+        </p:spPr>
+        <p:txBody>
+          <a:bodyPr>
+            <a:normAutofit/>
+          </a:bodyPr>
+          <a:lstStyle/>
+          <a:p>
+            <a:endParaRPr lang="en-GB"/>
+          </a:p>
+        </p:txBody>
+      </p:sp>
+      <p:cxnSp>
+        <p:nvCxnSpPr>
+          <p:cNvPr id="22" name="Straight Connector 10">
+            <a:extLst>
+              <a:ext uri="{FF2B5EF4-FFF2-40B4-BE49-F238E27FC236}">
+                <a16:creationId xmlns:a16="http://schemas.microsoft.com/office/drawing/2014/main" id="{D28A9C89-B313-458F-9C85-515930A51A93}"/>
+              </a:ext>
+              <a:ext uri="{C183D7F6-B498-43B3-948B-1728B52AA6E4}">
+                <adec:decorative xmlns:adec="http://schemas.microsoft.com/office/drawing/2017/decorative" val="1"/>
+              </a:ext>
+            </a:extLst>
+          </p:cNvPr>
+          <p:cNvCxnSpPr>
+            <a:cxnSpLocks noGrp="1" noRot="1" noChangeAspect="1" noMove="1" noResize="1" noEditPoints="1" noAdjustHandles="1" noChangeArrowheads="1" noChangeShapeType="1"/>
+          </p:cNvCxnSpPr>
+          <p:nvPr>
+            <p:extLst>
+              <p:ext uri="{386F3935-93C4-4BCD-93E2-E3B085C9AB24}">
+                <p16:designElem xmlns:p16="http://schemas.microsoft.com/office/powerpoint/2015/main" val="1"/>
+              </p:ext>
+            </p:extLst>
+          </p:nvPr>
+        </p:nvCxnSpPr>
+        <p:spPr>
+          <a:xfrm>
+            <a:off x="772429" y="4641183"/>
+            <a:ext cx="6309360" cy="0"/>
+          </a:xfrm>
+          <a:prstGeom prst="line">
+            <a:avLst/>
+          </a:prstGeom>
+          <a:ln w="19050">
+            <a:solidFill>
+              <a:schemeClr val="accent1">
+                <a:alpha val="90000"/>
+              </a:schemeClr>
+            </a:solidFill>
+          </a:ln>
+        </p:spPr>
+        <p:style>
+          <a:lnRef idx="1">
+            <a:schemeClr val="accent1"/>
+          </a:lnRef>
+          <a:fillRef idx="0">
+            <a:schemeClr val="accent1"/>
+          </a:fillRef>
+          <a:effectRef idx="0">
+            <a:schemeClr val="accent1"/>
+          </a:effectRef>
+          <a:fontRef idx="minor">
+            <a:schemeClr val="tx1"/>
+          </a:fontRef>
+        </p:style>
+      </p:cxnSp>
+      <p:sp>
+        <p:nvSpPr>
+          <p:cNvPr id="13" name="Rectangle 12">
+            <a:extLst>
+              <a:ext uri="{FF2B5EF4-FFF2-40B4-BE49-F238E27FC236}">
+                <a16:creationId xmlns:a16="http://schemas.microsoft.com/office/drawing/2014/main" id="{C390A367-0330-4E03-9D5F-40308A7975C8}"/>
+              </a:ext>
+              <a:ext uri="{C183D7F6-B498-43B3-948B-1728B52AA6E4}">
+                <adec:decorative xmlns:adec="http://schemas.microsoft.com/office/drawing/2017/decorative" val="1"/>
+              </a:ext>
+            </a:extLst>
+          </p:cNvPr>
+          <p:cNvSpPr>
+            <a:spLocks noGrp="1" noRot="1" noChangeAspect="1" noMove="1" noResize="1" noEditPoints="1" noAdjustHandles="1" noChangeArrowheads="1" noChangeShapeType="1" noTextEdit="1"/>
+          </p:cNvSpPr>
+          <p:nvPr>
+            <p:extLst>
+              <p:ext uri="{386F3935-93C4-4BCD-93E2-E3B085C9AB24}">
+                <p16:designElem xmlns:p16="http://schemas.microsoft.com/office/powerpoint/2015/main" val="1"/>
+              </p:ext>
+            </p:extLst>
+          </p:nvPr>
+        </p:nvSpPr>
+        <p:spPr>
+          <a:xfrm>
+            <a:off x="1" y="6400800"/>
+            <a:ext cx="12192000" cy="457200"/>
+          </a:xfrm>
+          <a:prstGeom prst="rect">
+            <a:avLst/>
+          </a:prstGeom>
+          <a:solidFill>
+            <a:srgbClr val="262626">
+              <a:alpha val="95000"/>
+            </a:srgbClr>
+          </a:solidFill>
+          <a:ln>
+            <a:noFill/>
+          </a:ln>
+        </p:spPr>
+        <p:style>
+          <a:lnRef idx="2">
+            <a:schemeClr val="accent1">
+              <a:shade val="50000"/>
+            </a:schemeClr>
+          </a:lnRef>
+          <a:fillRef idx="1">
+            <a:schemeClr val="accent1"/>
+          </a:fillRef>
+          <a:effectRef idx="0">
+            <a:schemeClr val="accent1"/>
+          </a:effectRef>
+          <a:fontRef idx="minor">
+            <a:schemeClr val="lt1"/>
+          </a:fontRef>
+        </p:style>
+      </p:sp>
+    </p:spTree>
+    <p:extLst>
+      <p:ext uri="{BB962C8B-B14F-4D97-AF65-F5344CB8AC3E}">
+        <p14:creationId xmlns:p14="http://schemas.microsoft.com/office/powerpoint/2010/main" val="965035078"/>
+      </p:ext>
+    </p:extLst>
+  </p:cSld>
+  <p:clrMapOvr>
+    <a:overrideClrMapping bg1="dk1" tx1="lt1" bg2="dk2" tx2="lt2" accent1="accent1" accent2="accent2" accent3="accent3" accent4="accent4" accent5="accent5" accent6="accent6" hlink="hlink" folHlink="folHlink"/>
+  </p:clrMapOvr>
+</p:sld>
+</file>
+
+<file path=ppt/slides/slide9.xml><?xml version="1.0" encoding="utf-8"?>
+<p:sld xmlns:a="http://schemas.openxmlformats.org/drawingml/2006/main" xmlns:r="http://schemas.openxmlformats.org/officeDocument/2006/relationships" xmlns:p="http://schemas.openxmlformats.org/presentationml/2006/main">
+  <p:cSld>
+    <p:spTree>
+      <p:nvGrpSpPr>
+        <p:cNvPr id="1" name=""/>
+        <p:cNvGrpSpPr/>
+        <p:nvPr/>
+      </p:nvGrpSpPr>
+      <p:grpSpPr>
+        <a:xfrm>
+          <a:off x="0" y="0"/>
+          <a:ext cx="0" cy="0"/>
+          <a:chOff x="0" y="0"/>
+          <a:chExt cx="0" cy="0"/>
+        </a:xfrm>
+      </p:grpSpPr>
+      <p:sp>
+        <p:nvSpPr>
+          <p:cNvPr id="2" name="Title 1">
+            <a:extLst>
+              <a:ext uri="{FF2B5EF4-FFF2-40B4-BE49-F238E27FC236}">
+                <a16:creationId xmlns:a16="http://schemas.microsoft.com/office/drawing/2014/main" id="{338A8B9E-7AF1-4C9C-AC40-613EEBD9C3C5}"/>
+              </a:ext>
+            </a:extLst>
+          </p:cNvPr>
+          <p:cNvSpPr>
+            <a:spLocks noGrp="1"/>
+          </p:cNvSpPr>
+          <p:nvPr>
+            <p:ph type="title"/>
+          </p:nvPr>
+        </p:nvSpPr>
+        <p:spPr/>
+        <p:txBody>
+          <a:bodyPr/>
+          <a:lstStyle/>
+          <a:p>
+            <a:endParaRPr lang="en-GB" dirty="0"/>
+          </a:p>
+        </p:txBody>
+      </p:sp>
+      <p:sp>
+        <p:nvSpPr>
+          <p:cNvPr id="5" name="Rectangle 2">
+            <a:extLst>
+              <a:ext uri="{FF2B5EF4-FFF2-40B4-BE49-F238E27FC236}">
+                <a16:creationId xmlns:a16="http://schemas.microsoft.com/office/drawing/2014/main" id="{A6EE29B0-6BC6-4725-A196-5956430E9C02}"/>
+              </a:ext>
+            </a:extLst>
+          </p:cNvPr>
+          <p:cNvSpPr>
+            <a:spLocks noGrp="1" noChangeArrowheads="1"/>
+          </p:cNvSpPr>
+          <p:nvPr>
+            <p:ph idx="1"/>
+          </p:nvPr>
+        </p:nvSpPr>
+        <p:spPr bwMode="auto">
+          <a:xfrm>
+            <a:off x="1160540" y="2034156"/>
+            <a:ext cx="10915360" cy="630942"/>
+          </a:xfrm>
+          <a:prstGeom prst="rect">
+            <a:avLst/>
+          </a:prstGeom>
+          <a:noFill/>
+          <a:ln>
+            <a:noFill/>
+          </a:ln>
+          <a:effectLst/>
+          <a:extLst>
+            <a:ext uri="{909E8E84-426E-40DD-AFC4-6F175D3DCCD1}">
+              <a14:hiddenFill xmlns:a14="http://schemas.microsoft.com/office/drawing/2010/main">
+                <a:solidFill>
+                  <a:schemeClr val="accent1"/>
+                </a:solidFill>
+              </a14:hiddenFill>
+            </a:ext>
+            <a:ext uri="{91240B29-F687-4F45-9708-019B960494DF}">
+              <a14:hiddenLine xmlns:a14="http://schemas.microsoft.com/office/drawing/2010/main" w="9525">
+                <a:solidFill>
+                  <a:schemeClr val="tx1"/>
+                </a:solidFill>
+                <a:miter lim="800000"/>
+                <a:headEnd/>
+                <a:tailEnd/>
+              </a14:hiddenLine>
+            </a:ext>
+            <a:ext uri="{AF507438-7753-43E0-B8FC-AC1667EBCBE1}">
+              <a14:hiddenEffects xmlns:a14="http://schemas.microsoft.com/office/drawing/2010/main">
+                <a:effectLst>
+                  <a:outerShdw dist="35921" dir="2700000" algn="ctr" rotWithShape="0">
+                    <a:schemeClr val="bg2"/>
+                  </a:outerShdw>
+                </a:effectLst>
+              </a14:hiddenEffects>
+            </a:ext>
+          </a:extLst>
+        </p:spPr>
+        <p:txBody>
+          <a:bodyPr vert="horz" wrap="none" lIns="91440" tIns="45720" rIns="91440" bIns="45720" numCol="1" anchor="ctr" anchorCtr="0" compatLnSpc="1">
+            <a:prstTxWarp prst="textNoShape">
+              <a:avLst/>
+            </a:prstTxWarp>
+            <a:spAutoFit/>
+          </a:bodyPr>
+          <a:lstStyle>
+            <a:lvl1pPr eaLnBrk="0" fontAlgn="base" hangingPunct="0">
+              <a:spcBef>
+                <a:spcPct val="0"/>
+              </a:spcBef>
+              <a:spcAft>
+                <a:spcPct val="0"/>
+              </a:spcAft>
+              <a:defRPr>
+                <a:solidFill>
+                  <a:schemeClr val="tx1"/>
+                </a:solidFill>
+                <a:latin typeface="Arial" panose="020B0604020202020204" pitchFamily="34" charset="0"/>
+              </a:defRPr>
+            </a:lvl1pPr>
+            <a:lvl2pPr eaLnBrk="0" fontAlgn="base" hangingPunct="0">
+              <a:spcBef>
+                <a:spcPct val="0"/>
+              </a:spcBef>
+              <a:spcAft>
+                <a:spcPct val="0"/>
+              </a:spcAft>
+              <a:defRPr>
+                <a:solidFill>
+                  <a:schemeClr val="tx1"/>
+                </a:solidFill>
+                <a:latin typeface="Arial" panose="020B0604020202020204" pitchFamily="34" charset="0"/>
+              </a:defRPr>
+            </a:lvl2pPr>
+            <a:lvl3pPr eaLnBrk="0" fontAlgn="base" hangingPunct="0">
+              <a:spcBef>
+                <a:spcPct val="0"/>
+              </a:spcBef>
+              <a:spcAft>
+                <a:spcPct val="0"/>
+              </a:spcAft>
+              <a:defRPr>
+                <a:solidFill>
+                  <a:schemeClr val="tx1"/>
+                </a:solidFill>
+                <a:latin typeface="Arial" panose="020B0604020202020204" pitchFamily="34" charset="0"/>
+              </a:defRPr>
+            </a:lvl3pPr>
+            <a:lvl4pPr eaLnBrk="0" fontAlgn="base" hangingPunct="0">
+              <a:spcBef>
+                <a:spcPct val="0"/>
+              </a:spcBef>
+              <a:spcAft>
+                <a:spcPct val="0"/>
+              </a:spcAft>
+              <a:defRPr>
+                <a:solidFill>
+                  <a:schemeClr val="tx1"/>
+                </a:solidFill>
+                <a:latin typeface="Arial" panose="020B0604020202020204" pitchFamily="34" charset="0"/>
+              </a:defRPr>
+            </a:lvl4pPr>
+            <a:lvl5pPr eaLnBrk="0" fontAlgn="base" hangingPunct="0">
+              <a:spcBef>
+                <a:spcPct val="0"/>
+              </a:spcBef>
+              <a:spcAft>
+                <a:spcPct val="0"/>
+              </a:spcAft>
+              <a:defRPr>
+                <a:solidFill>
+                  <a:schemeClr val="tx1"/>
+                </a:solidFill>
+                <a:latin typeface="Arial" panose="020B0604020202020204" pitchFamily="34" charset="0"/>
+              </a:defRPr>
+            </a:lvl5pPr>
+            <a:lvl6pPr eaLnBrk="0" fontAlgn="base" hangingPunct="0">
+              <a:spcBef>
+                <a:spcPct val="0"/>
+              </a:spcBef>
+              <a:spcAft>
+                <a:spcPct val="0"/>
+              </a:spcAft>
+              <a:defRPr>
+                <a:solidFill>
+                  <a:schemeClr val="tx1"/>
+                </a:solidFill>
+                <a:latin typeface="Arial" panose="020B0604020202020204" pitchFamily="34" charset="0"/>
+              </a:defRPr>
+            </a:lvl6pPr>
+            <a:lvl7pPr eaLnBrk="0" fontAlgn="base" hangingPunct="0">
+              <a:spcBef>
+                <a:spcPct val="0"/>
+              </a:spcBef>
+              <a:spcAft>
+                <a:spcPct val="0"/>
+              </a:spcAft>
+              <a:defRPr>
+                <a:solidFill>
+                  <a:schemeClr val="tx1"/>
+                </a:solidFill>
+                <a:latin typeface="Arial" panose="020B0604020202020204" pitchFamily="34" charset="0"/>
+              </a:defRPr>
+            </a:lvl7pPr>
+            <a:lvl8pPr eaLnBrk="0" fontAlgn="base" hangingPunct="0">
+              <a:spcBef>
+                <a:spcPct val="0"/>
+              </a:spcBef>
+              <a:spcAft>
+                <a:spcPct val="0"/>
+              </a:spcAft>
+              <a:defRPr>
+                <a:solidFill>
+                  <a:schemeClr val="tx1"/>
+                </a:solidFill>
+                <a:latin typeface="Arial" panose="020B0604020202020204" pitchFamily="34" charset="0"/>
+              </a:defRPr>
+            </a:lvl8pPr>
+            <a:lvl9pPr eaLnBrk="0" fontAlgn="base" hangingPunct="0">
+              <a:spcBef>
+                <a:spcPct val="0"/>
+              </a:spcBef>
+              <a:spcAft>
+                <a:spcPct val="0"/>
+              </a:spcAft>
+              <a:defRPr>
+                <a:solidFill>
+                  <a:schemeClr val="tx1"/>
+                </a:solidFill>
+                <a:latin typeface="Arial" panose="020B0604020202020204" pitchFamily="34" charset="0"/>
+              </a:defRPr>
+            </a:lvl9pPr>
+          </a:lstStyle>
+          <a:p>
+            <a:pPr marL="0" marR="0" lvl="0" indent="0" algn="l" defTabSz="914400" rtl="0" eaLnBrk="0" fontAlgn="base" latinLnBrk="0" hangingPunct="0">
+              <a:lnSpc>
+                <a:spcPct val="100000"/>
+              </a:lnSpc>
+              <a:spcBef>
+                <a:spcPct val="0"/>
+              </a:spcBef>
+              <a:spcAft>
+                <a:spcPct val="0"/>
+              </a:spcAft>
+              <a:buClrTx/>
+              <a:buSzTx/>
+              <a:buFontTx/>
+              <a:buNone/>
+              <a:tabLst/>
+            </a:pPr>
+            <a:r>
+              <a:rPr kumimoji="0" lang="en-US" altLang="en-US" sz="1800" b="0" i="0" u="none" strike="noStrike" cap="none" normalizeH="0" baseline="0" dirty="0">
+                <a:ln>
+                  <a:noFill/>
+                </a:ln>
+                <a:solidFill>
+                  <a:srgbClr val="171717"/>
+                </a:solidFill>
+                <a:effectLst/>
+                <a:latin typeface="Segoe UI" panose="020B0502040204020203" pitchFamily="34" charset="0"/>
+                <a:cs typeface="Segoe UI" panose="020B0502040204020203" pitchFamily="34" charset="0"/>
+              </a:rPr>
+              <a:t>Indices: The index</a:t>
+            </a:r>
+            <a:r>
+              <a:rPr kumimoji="0" lang="en-US" altLang="en-US" sz="1800" b="0" i="0" u="none" strike="noStrike" cap="none" normalizeH="0" dirty="0">
+                <a:ln>
+                  <a:noFill/>
+                </a:ln>
+                <a:solidFill>
+                  <a:srgbClr val="171717"/>
+                </a:solidFill>
+                <a:effectLst/>
+                <a:latin typeface="Segoe UI" panose="020B0502040204020203" pitchFamily="34" charset="0"/>
+                <a:cs typeface="Segoe UI" panose="020B0502040204020203" pitchFamily="34" charset="0"/>
+              </a:rPr>
+              <a:t> </a:t>
+            </a:r>
+            <a:r>
+              <a:rPr kumimoji="0" lang="en-US" altLang="en-US" sz="1800" b="0" i="0" u="none" strike="noStrike" cap="none" normalizeH="0" baseline="0" dirty="0">
+                <a:ln>
+                  <a:noFill/>
+                </a:ln>
+                <a:solidFill>
+                  <a:srgbClr val="171717"/>
+                </a:solidFill>
+                <a:effectLst/>
+                <a:latin typeface="+mn-lt"/>
+                <a:cs typeface="Segoe UI" panose="020B0502040204020203" pitchFamily="34" charset="0"/>
+              </a:rPr>
+              <a:t>from</a:t>
+            </a:r>
+            <a:r>
+              <a:rPr kumimoji="0" lang="en-US" altLang="en-US" sz="1800" b="0" i="0" u="none" strike="noStrike" cap="none" normalizeH="0" baseline="0" dirty="0">
+                <a:ln>
+                  <a:noFill/>
+                </a:ln>
+                <a:solidFill>
+                  <a:srgbClr val="171717"/>
+                </a:solidFill>
+                <a:effectLst/>
+                <a:latin typeface="Segoe UI" panose="020B0502040204020203" pitchFamily="34" charset="0"/>
+                <a:cs typeface="Segoe UI" panose="020B0502040204020203" pitchFamily="34" charset="0"/>
+              </a:rPr>
+              <a:t> end operator </a:t>
+            </a:r>
+            <a:r>
+              <a:rPr kumimoji="0" lang="en-US" altLang="en-US" sz="1800" b="0" i="0" u="none" strike="noStrike" cap="none" normalizeH="0" baseline="0" dirty="0">
+                <a:ln>
+                  <a:noFill/>
+                </a:ln>
+                <a:solidFill>
+                  <a:srgbClr val="171717"/>
+                </a:solidFill>
+                <a:effectLst/>
+                <a:latin typeface="SFMono-Regular"/>
+              </a:rPr>
+              <a:t>^</a:t>
+            </a:r>
+            <a:r>
+              <a:rPr kumimoji="0" lang="en-US" altLang="en-US" sz="1800" b="0" i="0" u="none" strike="noStrike" cap="none" normalizeH="0" baseline="0" dirty="0">
+                <a:ln>
+                  <a:noFill/>
+                </a:ln>
+                <a:solidFill>
+                  <a:srgbClr val="171717"/>
+                </a:solidFill>
+                <a:effectLst/>
+                <a:latin typeface="Segoe UI" panose="020B0502040204020203" pitchFamily="34" charset="0"/>
+                <a:cs typeface="Segoe UI" panose="020B0502040204020203" pitchFamily="34" charset="0"/>
+              </a:rPr>
+              <a:t>, which specifies that an index is relative to the end of the sequence</a:t>
+            </a:r>
+            <a:r>
+              <a:rPr kumimoji="0" lang="en-US" altLang="en-US" sz="1200" b="0" i="0" u="none" strike="noStrike" cap="none" normalizeH="0" baseline="0" dirty="0">
+                <a:ln>
+                  <a:noFill/>
+                </a:ln>
+                <a:solidFill>
+                  <a:srgbClr val="171717"/>
+                </a:solidFill>
+                <a:effectLst/>
+                <a:latin typeface="Segoe UI" panose="020B0502040204020203" pitchFamily="34" charset="0"/>
+                <a:cs typeface="Segoe UI" panose="020B0502040204020203" pitchFamily="34" charset="0"/>
+              </a:rPr>
+              <a:t>.</a:t>
+            </a:r>
+          </a:p>
+          <a:p>
+            <a:pPr marL="0" marR="0" lvl="0" indent="0" algn="l" defTabSz="914400" rtl="0" eaLnBrk="0" fontAlgn="base" latinLnBrk="0" hangingPunct="0">
+              <a:lnSpc>
+                <a:spcPct val="100000"/>
+              </a:lnSpc>
+              <a:spcBef>
+                <a:spcPct val="0"/>
+              </a:spcBef>
+              <a:spcAft>
+                <a:spcPct val="0"/>
+              </a:spcAft>
+              <a:buClrTx/>
+              <a:buSzTx/>
+              <a:buFontTx/>
+              <a:buNone/>
+              <a:tabLst/>
+            </a:pPr>
+            <a:endParaRPr lang="en-US" altLang="en-US" sz="1200" dirty="0">
+              <a:solidFill>
+                <a:srgbClr val="171717"/>
+              </a:solidFill>
+              <a:latin typeface="Segoe UI" panose="020B0502040204020203" pitchFamily="34" charset="0"/>
+              <a:cs typeface="Segoe UI" panose="020B0502040204020203" pitchFamily="34" charset="0"/>
+            </a:endParaRPr>
+          </a:p>
+          <a:p>
+            <a:pPr marL="0" marR="0" lvl="0" indent="0" algn="l" defTabSz="914400" rtl="0" eaLnBrk="0" fontAlgn="base" latinLnBrk="0" hangingPunct="0">
+              <a:lnSpc>
+                <a:spcPct val="100000"/>
+              </a:lnSpc>
+              <a:spcBef>
+                <a:spcPct val="0"/>
+              </a:spcBef>
+              <a:spcAft>
+                <a:spcPct val="0"/>
+              </a:spcAft>
+              <a:buClrTx/>
+              <a:buSzTx/>
+              <a:buFontTx/>
+              <a:buNone/>
+              <a:tabLst/>
+            </a:pPr>
+            <a:r>
+              <a:rPr kumimoji="0" lang="en-US" altLang="en-US" sz="500" b="0" i="0" u="none" strike="noStrike" cap="none" normalizeH="0" baseline="0" dirty="0">
+                <a:ln>
+                  <a:noFill/>
+                </a:ln>
+                <a:solidFill>
+                  <a:schemeClr val="tx1"/>
+                </a:solidFill>
+                <a:effectLst/>
+              </a:rPr>
+              <a:t> </a:t>
+            </a:r>
+            <a:endParaRPr kumimoji="0" lang="en-US" altLang="en-US" sz="1800" b="0" i="0" u="none" strike="noStrike" cap="none" normalizeH="0" baseline="0" dirty="0">
+              <a:ln>
+                <a:noFill/>
+              </a:ln>
+              <a:solidFill>
+                <a:schemeClr val="tx1"/>
+              </a:solidFill>
+              <a:effectLst/>
+              <a:latin typeface="Arial" panose="020B0604020202020204" pitchFamily="34" charset="0"/>
+            </a:endParaRPr>
+          </a:p>
+        </p:txBody>
+      </p:sp>
+      <p:sp>
+        <p:nvSpPr>
+          <p:cNvPr id="6" name="Rectangle 2">
+            <a:extLst>
+              <a:ext uri="{FF2B5EF4-FFF2-40B4-BE49-F238E27FC236}">
+                <a16:creationId xmlns:a16="http://schemas.microsoft.com/office/drawing/2014/main" id="{56E31586-206B-4958-A2F0-C0DACD9404FD}"/>
+              </a:ext>
+            </a:extLst>
+          </p:cNvPr>
+          <p:cNvSpPr txBox="1">
+            <a:spLocks noChangeArrowheads="1"/>
+          </p:cNvSpPr>
+          <p:nvPr/>
+        </p:nvSpPr>
+        <p:spPr bwMode="auto">
+          <a:xfrm>
+            <a:off x="1220925" y="2777228"/>
+            <a:ext cx="5467843" cy="369332"/>
+          </a:xfrm>
+          <a:prstGeom prst="rect">
+            <a:avLst/>
+          </a:prstGeom>
+          <a:noFill/>
+          <a:ln>
+            <a:noFill/>
+          </a:ln>
+          <a:effectLst/>
+          <a:extLst>
+            <a:ext uri="{909E8E84-426E-40DD-AFC4-6F175D3DCCD1}">
+              <a14:hiddenFill xmlns:a14="http://schemas.microsoft.com/office/drawing/2010/main">
+                <a:solidFill>
+                  <a:schemeClr val="accent1"/>
+                </a:solidFill>
+              </a14:hiddenFill>
+            </a:ext>
+            <a:ext uri="{91240B29-F687-4F45-9708-019B960494DF}">
+              <a14:hiddenLine xmlns:a14="http://schemas.microsoft.com/office/drawing/2010/main" w="9525">
+                <a:solidFill>
+                  <a:schemeClr val="tx1"/>
+                </a:solidFill>
+                <a:miter lim="800000"/>
+                <a:headEnd/>
+                <a:tailEnd/>
+              </a14:hiddenLine>
+            </a:ext>
+            <a:ext uri="{AF507438-7753-43E0-B8FC-AC1667EBCBE1}">
+              <a14:hiddenEffects xmlns:a14="http://schemas.microsoft.com/office/drawing/2010/main">
+                <a:effectLst>
+                  <a:outerShdw dist="35921" dir="2700000" algn="ctr" rotWithShape="0">
+                    <a:schemeClr val="bg2"/>
+                  </a:outerShdw>
+                </a:effectLst>
+              </a14:hiddenEffects>
+            </a:ext>
+          </a:extLst>
+        </p:spPr>
+        <p:txBody>
+          <a:bodyPr vert="horz" wrap="none" lIns="91440" tIns="45720" rIns="91440" bIns="45720" numCol="1" rtlCol="0" anchor="ctr" anchorCtr="0" compatLnSpc="1">
+            <a:prstTxWarp prst="textNoShape">
+              <a:avLst/>
+            </a:prstTxWarp>
+            <a:spAutoFit/>
+          </a:bodyPr>
+          <a:lstStyle>
+            <a:lvl1pPr marL="91440" indent="-91440" algn="l" defTabSz="914400" rtl="0" eaLnBrk="0" fontAlgn="base" latinLnBrk="0" hangingPunct="0">
+              <a:lnSpc>
+                <a:spcPct val="100000"/>
+              </a:lnSpc>
+              <a:spcBef>
+                <a:spcPct val="0"/>
+              </a:spcBef>
+              <a:spcAft>
+                <a:spcPct val="0"/>
+              </a:spcAft>
+              <a:buClr>
+                <a:schemeClr val="accent1"/>
+              </a:buClr>
+              <a:buSzPct val="100000"/>
+              <a:buFont typeface="Calibri" panose="020F0502020204030204" pitchFamily="34" charset="0"/>
+              <a:buChar char=" "/>
+              <a:defRPr sz="2000" kern="1200">
+                <a:solidFill>
+                  <a:schemeClr val="tx1"/>
+                </a:solidFill>
+                <a:latin typeface="Arial" panose="020B0604020202020204" pitchFamily="34" charset="0"/>
+                <a:ea typeface="+mn-ea"/>
+                <a:cs typeface="+mn-cs"/>
+              </a:defRPr>
+            </a:lvl1pPr>
+            <a:lvl2pPr marL="384048" indent="-182880" algn="l" defTabSz="914400" rtl="0" eaLnBrk="0" fontAlgn="base" latinLnBrk="0" hangingPunct="0">
+              <a:lnSpc>
+                <a:spcPct val="100000"/>
+              </a:lnSpc>
+              <a:spcBef>
+                <a:spcPct val="0"/>
+              </a:spcBef>
+              <a:spcAft>
+                <a:spcPct val="0"/>
+              </a:spcAft>
+              <a:buClrTx/>
+              <a:buFont typeface="Calibri" pitchFamily="34" charset="0"/>
+              <a:buChar char="◦"/>
+              <a:defRPr sz="1800" kern="1200">
+                <a:solidFill>
+                  <a:schemeClr val="tx1"/>
+                </a:solidFill>
+                <a:latin typeface="Arial" panose="020B0604020202020204" pitchFamily="34" charset="0"/>
+                <a:ea typeface="+mn-ea"/>
+                <a:cs typeface="+mn-cs"/>
+              </a:defRPr>
+            </a:lvl2pPr>
+            <a:lvl3pPr marL="566928" indent="-182880" algn="l" defTabSz="914400" rtl="0" eaLnBrk="0" fontAlgn="base" latinLnBrk="0" hangingPunct="0">
+              <a:lnSpc>
+                <a:spcPct val="100000"/>
+              </a:lnSpc>
+              <a:spcBef>
+                <a:spcPct val="0"/>
+              </a:spcBef>
+              <a:spcAft>
+                <a:spcPct val="0"/>
+              </a:spcAft>
+              <a:buClrTx/>
+              <a:buFont typeface="Calibri" pitchFamily="34" charset="0"/>
+              <a:buChar char="◦"/>
+              <a:defRPr sz="1400" kern="1200">
+                <a:solidFill>
+                  <a:schemeClr val="tx1"/>
+                </a:solidFill>
+                <a:latin typeface="Arial" panose="020B0604020202020204" pitchFamily="34" charset="0"/>
+                <a:ea typeface="+mn-ea"/>
+                <a:cs typeface="+mn-cs"/>
+              </a:defRPr>
+            </a:lvl3pPr>
+            <a:lvl4pPr marL="749808" indent="-182880" algn="l" defTabSz="914400" rtl="0" eaLnBrk="0" fontAlgn="base" latinLnBrk="0" hangingPunct="0">
+              <a:lnSpc>
+                <a:spcPct val="100000"/>
+              </a:lnSpc>
+              <a:spcBef>
+                <a:spcPct val="0"/>
+              </a:spcBef>
+              <a:spcAft>
+                <a:spcPct val="0"/>
+              </a:spcAft>
+              <a:buClrTx/>
+              <a:buFont typeface="Calibri" pitchFamily="34" charset="0"/>
+              <a:buChar char="◦"/>
+              <a:defRPr sz="1400" kern="1200">
+                <a:solidFill>
+                  <a:schemeClr val="tx1"/>
+                </a:solidFill>
+                <a:latin typeface="Arial" panose="020B0604020202020204" pitchFamily="34" charset="0"/>
+                <a:ea typeface="+mn-ea"/>
+                <a:cs typeface="+mn-cs"/>
+              </a:defRPr>
+            </a:lvl4pPr>
+            <a:lvl5pPr marL="932688" indent="-182880" algn="l" defTabSz="914400" rtl="0" eaLnBrk="0" fontAlgn="base" latinLnBrk="0" hangingPunct="0">
+              <a:lnSpc>
+                <a:spcPct val="100000"/>
+              </a:lnSpc>
+              <a:spcBef>
+                <a:spcPct val="0"/>
+              </a:spcBef>
+              <a:spcAft>
+                <a:spcPct val="0"/>
+              </a:spcAft>
+              <a:buClrTx/>
+              <a:buFont typeface="Calibri" pitchFamily="34" charset="0"/>
+              <a:buChar char="◦"/>
+              <a:defRPr sz="1400" kern="1200">
+                <a:solidFill>
+                  <a:schemeClr val="tx1"/>
+                </a:solidFill>
+                <a:latin typeface="Arial" panose="020B0604020202020204" pitchFamily="34" charset="0"/>
+                <a:ea typeface="+mn-ea"/>
+                <a:cs typeface="+mn-cs"/>
+              </a:defRPr>
+            </a:lvl5pPr>
+            <a:lvl6pPr marL="1100000" indent="-228600" algn="l" defTabSz="914400" rtl="0" eaLnBrk="0" fontAlgn="base" latinLnBrk="0" hangingPunct="0">
+              <a:lnSpc>
+                <a:spcPct val="90000"/>
+              </a:lnSpc>
+              <a:spcBef>
+                <a:spcPct val="0"/>
+              </a:spcBef>
+              <a:spcAft>
+                <a:spcPct val="0"/>
+              </a:spcAft>
+              <a:buClr>
+                <a:schemeClr val="accent1"/>
+              </a:buClr>
+              <a:buFont typeface="Calibri" pitchFamily="34" charset="0"/>
+              <a:buChar char="◦"/>
+              <a:defRPr sz="1400" kern="1200">
+                <a:solidFill>
+                  <a:schemeClr val="tx1"/>
+                </a:solidFill>
+                <a:latin typeface="Arial" panose="020B0604020202020204" pitchFamily="34" charset="0"/>
+                <a:ea typeface="+mn-ea"/>
+                <a:cs typeface="+mn-cs"/>
+              </a:defRPr>
+            </a:lvl6pPr>
+            <a:lvl7pPr marL="1300000" indent="-228600" algn="l" defTabSz="914400" rtl="0" eaLnBrk="0" fontAlgn="base" latinLnBrk="0" hangingPunct="0">
+              <a:lnSpc>
+                <a:spcPct val="90000"/>
+              </a:lnSpc>
+              <a:spcBef>
+                <a:spcPct val="0"/>
+              </a:spcBef>
+              <a:spcAft>
+                <a:spcPct val="0"/>
+              </a:spcAft>
+              <a:buClr>
+                <a:schemeClr val="accent1"/>
+              </a:buClr>
+              <a:buFont typeface="Calibri" pitchFamily="34" charset="0"/>
+              <a:buChar char="◦"/>
+              <a:defRPr sz="1400" kern="1200">
+                <a:solidFill>
+                  <a:schemeClr val="tx1"/>
+                </a:solidFill>
+                <a:latin typeface="Arial" panose="020B0604020202020204" pitchFamily="34" charset="0"/>
+                <a:ea typeface="+mn-ea"/>
+                <a:cs typeface="+mn-cs"/>
+              </a:defRPr>
+            </a:lvl7pPr>
+            <a:lvl8pPr marL="1500000" indent="-228600" algn="l" defTabSz="914400" rtl="0" eaLnBrk="0" fontAlgn="base" latinLnBrk="0" hangingPunct="0">
+              <a:lnSpc>
+                <a:spcPct val="90000"/>
+              </a:lnSpc>
+              <a:spcBef>
+                <a:spcPct val="0"/>
+              </a:spcBef>
+              <a:spcAft>
+                <a:spcPct val="0"/>
+              </a:spcAft>
+              <a:buClr>
+                <a:schemeClr val="accent1"/>
+              </a:buClr>
+              <a:buFont typeface="Calibri" pitchFamily="34" charset="0"/>
+              <a:buChar char="◦"/>
+              <a:defRPr sz="1400" kern="1200">
+                <a:solidFill>
+                  <a:schemeClr val="tx1"/>
+                </a:solidFill>
+                <a:latin typeface="Arial" panose="020B0604020202020204" pitchFamily="34" charset="0"/>
+                <a:ea typeface="+mn-ea"/>
+                <a:cs typeface="+mn-cs"/>
+              </a:defRPr>
+            </a:lvl8pPr>
+            <a:lvl9pPr marL="1700000" indent="-228600" algn="l" defTabSz="914400" rtl="0" eaLnBrk="0" fontAlgn="base" latinLnBrk="0" hangingPunct="0">
+              <a:lnSpc>
+                <a:spcPct val="90000"/>
+              </a:lnSpc>
+              <a:spcBef>
+                <a:spcPct val="0"/>
+              </a:spcBef>
+              <a:spcAft>
+                <a:spcPct val="0"/>
+              </a:spcAft>
+              <a:buClr>
+                <a:schemeClr val="accent1"/>
+              </a:buClr>
+              <a:buFont typeface="Calibri" pitchFamily="34" charset="0"/>
+              <a:buChar char="◦"/>
+              <a:defRPr sz="1400" kern="1200">
+                <a:solidFill>
+                  <a:schemeClr val="tx1"/>
+                </a:solidFill>
+                <a:latin typeface="Arial" panose="020B0604020202020204" pitchFamily="34" charset="0"/>
+                <a:ea typeface="+mn-ea"/>
+                <a:cs typeface="+mn-cs"/>
+              </a:defRPr>
+            </a:lvl9pPr>
+          </a:lstStyle>
+          <a:p>
+            <a:pPr marL="0" indent="0">
+              <a:buClrTx/>
+              <a:buSzTx/>
+              <a:buFontTx/>
+              <a:buNone/>
+            </a:pPr>
+            <a:r>
+              <a:rPr lang="en-US" altLang="en-US" sz="1800" dirty="0">
+                <a:latin typeface="+mn-lt"/>
+              </a:rPr>
+              <a:t>Range Operator:  … Which specifies sub range of a range </a:t>
+            </a:r>
+          </a:p>
+        </p:txBody>
+      </p:sp>
+    </p:spTree>
+    <p:extLst>
+      <p:ext uri="{BB962C8B-B14F-4D97-AF65-F5344CB8AC3E}">
+        <p14:creationId xmlns:p14="http://schemas.microsoft.com/office/powerpoint/2010/main" val="3760987599"/>
+      </p:ext>
+    </p:extLst>
+  </p:cSld>
+  <p:clrMapOvr>
+    <a:masterClrMapping/>
+  </p:clrMapOvr>
+  <p:timing>
+    <p:tnLst>
+      <p:par>
+        <p:cTn id="1" dur="indefinite" restart="never" nodeType="tmRoot">
+          <p:childTnLst>
+            <p:seq concurrent="1" nextAc="seek">
+              <p:cTn id="2" dur="indefinite" nodeType="mainSeq">
+                <p:childTnLst>
+                  <p:par>
+                    <p:cTn id="3" fill="hold">
+                      <p:stCondLst>
+                        <p:cond delay="indefinite"/>
+                      </p:stCondLst>
+                      <p:childTnLst>
+                        <p:par>
+                          <p:cTn id="4" fill="hold">
+                            <p:stCondLst>
+                              <p:cond delay="0"/>
+                            </p:stCondLst>
+                            <p:childTnLst>
+                              <p:par>
+                                <p:cTn id="5" presetID="10" presetClass="entr" presetSubtype="0" fill="hold" grpId="0" nodeType="clickEffect">
+                                  <p:stCondLst>
+                                    <p:cond delay="0"/>
+                                  </p:stCondLst>
+                                  <p:childTnLst>
+                                    <p:set>
+                                      <p:cBhvr>
+                                        <p:cTn id="6" dur="1" fill="hold">
+                                          <p:stCondLst>
+                                            <p:cond delay="0"/>
+                                          </p:stCondLst>
+                                        </p:cTn>
+                                        <p:tgtEl>
+                                          <p:spTgt spid="5">
+                                            <p:txEl>
+                                              <p:pRg st="0" end="0"/>
+                                            </p:txEl>
+                                          </p:spTgt>
+                                        </p:tgtEl>
+                                        <p:attrNameLst>
+                                          <p:attrName>style.visibility</p:attrName>
+                                        </p:attrNameLst>
+                                      </p:cBhvr>
+                                      <p:to>
+                                        <p:strVal val="visible"/>
+                                      </p:to>
+                                    </p:set>
+                                    <p:animEffect transition="in" filter="fade">
+                                      <p:cBhvr>
+                                        <p:cTn id="7" dur="500"/>
+                                        <p:tgtEl>
+                                          <p:spTgt spid="5">
+                                            <p:txEl>
+                                              <p:pRg st="0" end="0"/>
+                                            </p:txEl>
+                                          </p:spTgt>
+                                        </p:tgtEl>
+                                      </p:cBhvr>
+                                    </p:animEffect>
+                                  </p:childTnLst>
+                                </p:cTn>
+                              </p:par>
+                            </p:childTnLst>
+                          </p:cTn>
+                        </p:par>
+                      </p:childTnLst>
+                    </p:cTn>
+                  </p:par>
+                  <p:par>
+                    <p:cTn id="8" fill="hold">
+                      <p:stCondLst>
+                        <p:cond delay="indefinite"/>
+                      </p:stCondLst>
+                      <p:childTnLst>
+                        <p:par>
+                          <p:cTn id="9" fill="hold">
+                            <p:stCondLst>
+                              <p:cond delay="0"/>
+                            </p:stCondLst>
+                            <p:childTnLst>
+                              <p:par>
+                                <p:cTn id="10" presetID="42" presetClass="entr" presetSubtype="0" fill="hold" grpId="0" nodeType="clickEffect">
+                                  <p:stCondLst>
+                                    <p:cond delay="0"/>
+                                  </p:stCondLst>
+                                  <p:childTnLst>
+                                    <p:set>
+                                      <p:cBhvr>
+                                        <p:cTn id="11" dur="1" fill="hold">
+                                          <p:stCondLst>
+                                            <p:cond delay="0"/>
+                                          </p:stCondLst>
+                                        </p:cTn>
+                                        <p:tgtEl>
+                                          <p:spTgt spid="6"/>
+                                        </p:tgtEl>
+                                        <p:attrNameLst>
+                                          <p:attrName>style.visibility</p:attrName>
+                                        </p:attrNameLst>
+                                      </p:cBhvr>
+                                      <p:to>
+                                        <p:strVal val="visible"/>
+                                      </p:to>
+                                    </p:set>
+                                    <p:animEffect transition="in" filter="fade">
+                                      <p:cBhvr>
+                                        <p:cTn id="12" dur="1000"/>
+                                        <p:tgtEl>
+                                          <p:spTgt spid="6"/>
+                                        </p:tgtEl>
+                                      </p:cBhvr>
+                                    </p:animEffect>
+                                    <p:anim calcmode="lin" valueType="num">
+                                      <p:cBhvr>
+                                        <p:cTn id="13" dur="1000" fill="hold"/>
+                                        <p:tgtEl>
+                                          <p:spTgt spid="6"/>
+                                        </p:tgtEl>
+                                        <p:attrNameLst>
+                                          <p:attrName>ppt_x</p:attrName>
+                                        </p:attrNameLst>
+                                      </p:cBhvr>
+                                      <p:tavLst>
+                                        <p:tav tm="0">
+                                          <p:val>
+                                            <p:strVal val="#ppt_x"/>
+                                          </p:val>
+                                        </p:tav>
+                                        <p:tav tm="100000">
+                                          <p:val>
+                                            <p:strVal val="#ppt_x"/>
+                                          </p:val>
+                                        </p:tav>
+                                      </p:tavLst>
+                                    </p:anim>
+                                    <p:anim calcmode="lin" valueType="num">
+                                      <p:cBhvr>
+                                        <p:cTn id="14" dur="1000" fill="hold"/>
+                                        <p:tgtEl>
+                                          <p:spTgt spid="6"/>
+                                        </p:tgtEl>
+                                        <p:attrNameLst>
+                                          <p:attrName>ppt_y</p:attrName>
+                                        </p:attrNameLst>
+                                      </p:cBhvr>
+                                      <p:tavLst>
+                                        <p:tav tm="0">
+                                          <p:val>
+                                            <p:strVal val="#ppt_y+.1"/>
+                                          </p:val>
+                                        </p:tav>
+                                        <p:tav tm="100000">
+                                          <p:val>
+                                            <p:strVal val="#ppt_y"/>
+                                          </p:val>
+                                        </p:tav>
+                                      </p:tavLst>
+                                    </p:anim>
+                                  </p:childTnLst>
+                                </p:cTn>
+                              </p:par>
+                            </p:childTnLst>
+                          </p:cTn>
+                        </p:par>
+                      </p:childTnLst>
+                    </p:cTn>
+                  </p:par>
+                </p:childTnLst>
+              </p:cTn>
+              <p:prevCondLst>
+                <p:cond evt="onPrev" delay="0">
+                  <p:tgtEl>
+                    <p:sldTgt/>
+                  </p:tgtEl>
+                </p:cond>
+              </p:prevCondLst>
+              <p:nextCondLst>
+                <p:cond evt="onNext" delay="0">
+                  <p:tgtEl>
+                    <p:sldTgt/>
+                  </p:tgtEl>
+                </p:cond>
+              </p:nextCondLst>
+            </p:seq>
+          </p:childTnLst>
+        </p:cTn>
+      </p:par>
+    </p:tnLst>
+    <p:bldLst>
+      <p:bldP spid="5" grpId="0" uiExpand="1" build="p"/>
+      <p:bldP spid="6" grpId="0"/>
+    </p:bldLst>
+  </p:timing>
 </p:sld>
 </file>
 

</xml_diff>